<commit_message>
Change a botton label and Update contents table
</commit_message>
<xml_diff>
--- a/docs/GUI_Design_Concepts.pptx
+++ b/docs/GUI_Design_Concepts.pptx
@@ -310,7 +310,7 @@
           <a:p>
             <a:fld id="{E11AA8F0-6258-3347-BD1B-F58EE29071D0}" type="datetimeFigureOut">
               <a:rPr kumimoji="1" lang="ko-KR" altLang="en-US" smtClean="0"/>
-              <a:t>2016. 12. 7.</a:t>
+              <a:t>2016. 12. 8.</a:t>
             </a:fld>
             <a:endParaRPr kumimoji="1" lang="ko-KR" altLang="en-US"/>
           </a:p>
@@ -4783,7 +4783,7 @@
           <a:p>
             <a:fld id="{90048598-6D35-43ED-A7A9-749CF1B40A27}" type="datetimeFigureOut">
               <a:rPr lang="ko-KR" altLang="en-US" smtClean="0"/>
-              <a:t>2016. 12. 7.</a:t>
+              <a:t>2016. 12. 8.</a:t>
             </a:fld>
             <a:endParaRPr lang="ko-KR" altLang="en-US"/>
           </a:p>
@@ -4993,7 +4993,7 @@
           <a:p>
             <a:fld id="{90048598-6D35-43ED-A7A9-749CF1B40A27}" type="datetimeFigureOut">
               <a:rPr lang="ko-KR" altLang="en-US" smtClean="0"/>
-              <a:t>2016. 12. 7.</a:t>
+              <a:t>2016. 12. 8.</a:t>
             </a:fld>
             <a:endParaRPr lang="ko-KR" altLang="en-US"/>
           </a:p>
@@ -5203,7 +5203,7 @@
           <a:p>
             <a:fld id="{90048598-6D35-43ED-A7A9-749CF1B40A27}" type="datetimeFigureOut">
               <a:rPr lang="ko-KR" altLang="en-US" smtClean="0"/>
-              <a:t>2016. 12. 7.</a:t>
+              <a:t>2016. 12. 8.</a:t>
             </a:fld>
             <a:endParaRPr lang="ko-KR" altLang="en-US"/>
           </a:p>
@@ -6024,7 +6024,7 @@
           <a:p>
             <a:fld id="{90048598-6D35-43ED-A7A9-749CF1B40A27}" type="datetimeFigureOut">
               <a:rPr lang="ko-KR" altLang="en-US" smtClean="0"/>
-              <a:t>2016. 12. 7.</a:t>
+              <a:t>2016. 12. 8.</a:t>
             </a:fld>
             <a:endParaRPr lang="ko-KR" altLang="en-US"/>
           </a:p>
@@ -6430,7 +6430,7 @@
           <a:p>
             <a:fld id="{90048598-6D35-43ED-A7A9-749CF1B40A27}" type="datetimeFigureOut">
               <a:rPr lang="ko-KR" altLang="en-US" smtClean="0"/>
-              <a:t>2016. 12. 7.</a:t>
+              <a:t>2016. 12. 8.</a:t>
             </a:fld>
             <a:endParaRPr lang="ko-KR" altLang="en-US"/>
           </a:p>
@@ -6580,7 +6580,7 @@
           <a:p>
             <a:fld id="{90048598-6D35-43ED-A7A9-749CF1B40A27}" type="datetimeFigureOut">
               <a:rPr lang="ko-KR" altLang="en-US" smtClean="0"/>
-              <a:t>2016. 12. 7.</a:t>
+              <a:t>2016. 12. 8.</a:t>
             </a:fld>
             <a:endParaRPr lang="ko-KR" altLang="en-US"/>
           </a:p>
@@ -6699,7 +6699,7 @@
           <a:p>
             <a:fld id="{90048598-6D35-43ED-A7A9-749CF1B40A27}" type="datetimeFigureOut">
               <a:rPr lang="ko-KR" altLang="en-US" smtClean="0"/>
-              <a:t>2016. 12. 7.</a:t>
+              <a:t>2016. 12. 8.</a:t>
             </a:fld>
             <a:endParaRPr lang="ko-KR" altLang="en-US"/>
           </a:p>
@@ -7009,7 +7009,7 @@
           <a:p>
             <a:fld id="{90048598-6D35-43ED-A7A9-749CF1B40A27}" type="datetimeFigureOut">
               <a:rPr lang="ko-KR" altLang="en-US" smtClean="0"/>
-              <a:t>2016. 12. 7.</a:t>
+              <a:t>2016. 12. 8.</a:t>
             </a:fld>
             <a:endParaRPr lang="ko-KR" altLang="en-US"/>
           </a:p>
@@ -25827,8 +25827,62 @@
                   </a:schemeClr>
                 </a:solidFill>
               </a:rPr>
-              <a:t>Sign In</a:t>
-            </a:r>
+              <a:t>Sign </a:t>
+            </a:r>
+            <a:r>
+              <a:rPr lang="en-US" altLang="ko-KR" sz="1800" dirty="0" smtClean="0">
+                <a:solidFill>
+                  <a:schemeClr val="tx1">
+                    <a:lumMod val="75000"/>
+                    <a:lumOff val="25000"/>
+                  </a:schemeClr>
+                </a:solidFill>
+              </a:rPr>
+              <a:t>In</a:t>
+            </a:r>
+          </a:p>
+          <a:p>
+            <a:r>
+              <a:rPr lang="en-US" altLang="ko-KR" sz="1800" dirty="0" smtClean="0">
+                <a:solidFill>
+                  <a:schemeClr val="tx1">
+                    <a:lumMod val="75000"/>
+                    <a:lumOff val="25000"/>
+                  </a:schemeClr>
+                </a:solidFill>
+              </a:rPr>
+              <a:t>For Got </a:t>
+            </a:r>
+            <a:r>
+              <a:rPr lang="en-US" altLang="ko-KR" sz="1800" dirty="0">
+                <a:solidFill>
+                  <a:schemeClr val="tx1">
+                    <a:lumMod val="75000"/>
+                    <a:lumOff val="25000"/>
+                  </a:schemeClr>
+                </a:solidFill>
+              </a:rPr>
+              <a:t>P</a:t>
+            </a:r>
+            <a:r>
+              <a:rPr lang="en-US" altLang="ko-KR" sz="1800" dirty="0" smtClean="0">
+                <a:solidFill>
+                  <a:schemeClr val="tx1">
+                    <a:lumMod val="75000"/>
+                    <a:lumOff val="25000"/>
+                  </a:schemeClr>
+                </a:solidFill>
+              </a:rPr>
+              <a:t>assword</a:t>
+            </a:r>
+            <a:endParaRPr lang="en-US" altLang="ko-KR" sz="1800" dirty="0" smtClean="0">
+              <a:solidFill>
+                <a:schemeClr val="tx1">
+                  <a:lumMod val="75000"/>
+                  <a:lumOff val="25000"/>
+                </a:schemeClr>
+              </a:solidFill>
+            </a:endParaRPr>
           </a:p>
           <a:p>
             <a:r>
@@ -28744,14 +28798,14 @@
           <p:nvPr>
             <p:extLst>
               <p:ext uri="{D42A27DB-BD31-4B8C-83A1-F6EECF244321}">
-                <p14:modId xmlns:p14="http://schemas.microsoft.com/office/powerpoint/2010/main" val="487362795"/>
+                <p14:modId xmlns:p14="http://schemas.microsoft.com/office/powerpoint/2010/main" val="1210055927"/>
               </p:ext>
             </p:extLst>
           </p:nvPr>
         </p:nvGraphicFramePr>
         <p:xfrm>
           <a:off x="1559860" y="1176186"/>
-          <a:ext cx="10367683" cy="5445627"/>
+          <a:ext cx="10367683" cy="5682090"/>
         </p:xfrm>
         <a:graphic>
           <a:graphicData uri="http://schemas.openxmlformats.org/drawingml/2006/table">
@@ -30079,13 +30133,74 @@
                 </a:tc>
               </a:tr>
               <a:tr h="403617">
-                <a:tc>
+                <a:tc rowSpan="2">
                   <a:txBody>
                     <a:bodyPr/>
                     <a:lstStyle/>
                     <a:p>
                       <a:pPr latinLnBrk="1"/>
-                      <a:endParaRPr lang="ko-KR" altLang="en-US"/>
+                      <a:r>
+                        <a:rPr lang="en-US" altLang="ko-KR" dirty="0" err="1" smtClean="0"/>
+                        <a:t>Jeonghwan</a:t>
+                      </a:r>
+                      <a:r>
+                        <a:rPr lang="en-US" altLang="ko-KR" dirty="0" smtClean="0"/>
+                        <a:t> Bae</a:t>
+                      </a:r>
+                      <a:endParaRPr lang="ko-KR" altLang="en-US" dirty="0"/>
+                    </a:p>
+                  </a:txBody>
+                  <a:tcPr anchor="ctr">
+                    <a:lnL w="12700" cap="flat" cmpd="sng" algn="ctr">
+                      <a:solidFill>
+                        <a:schemeClr val="tx1"/>
+                      </a:solidFill>
+                      <a:prstDash val="solid"/>
+                      <a:round/>
+                      <a:headEnd type="none" w="med" len="med"/>
+                      <a:tailEnd type="none" w="med" len="med"/>
+                    </a:lnL>
+                    <a:lnR w="12700" cap="flat" cmpd="sng" algn="ctr">
+                      <a:solidFill>
+                        <a:schemeClr val="tx1"/>
+                      </a:solidFill>
+                      <a:prstDash val="solid"/>
+                      <a:round/>
+                      <a:headEnd type="none" w="med" len="med"/>
+                      <a:tailEnd type="none" w="med" len="med"/>
+                    </a:lnR>
+                    <a:lnT w="12700" cap="flat" cmpd="sng" algn="ctr">
+                      <a:solidFill>
+                        <a:schemeClr val="tx1"/>
+                      </a:solidFill>
+                      <a:prstDash val="solid"/>
+                      <a:round/>
+                      <a:headEnd type="none" w="med" len="med"/>
+                      <a:tailEnd type="none" w="med" len="med"/>
+                    </a:lnT>
+                    <a:lnB w="12700" cap="flat" cmpd="sng" algn="ctr">
+                      <a:solidFill>
+                        <a:schemeClr val="tx1"/>
+                      </a:solidFill>
+                      <a:prstDash val="solid"/>
+                      <a:round/>
+                      <a:headEnd type="none" w="med" len="med"/>
+                      <a:tailEnd type="none" w="med" len="med"/>
+                    </a:lnB>
+                    <a:noFill/>
+                  </a:tcPr>
+                </a:tc>
+                <a:tc rowSpan="2">
+                  <a:txBody>
+                    <a:bodyPr/>
+                    <a:lstStyle/>
+                    <a:p>
+                      <a:pPr algn="ctr" latinLnBrk="1"/>
+                      <a:r>
+                        <a:rPr lang="en-US" altLang="ko-KR" dirty="0" smtClean="0"/>
+                        <a:t>2016-12-08</a:t>
+                      </a:r>
+                      <a:endParaRPr lang="ko-KR" altLang="en-US" dirty="0"/>
                     </a:p>
                   </a:txBody>
                   <a:tcPr anchor="ctr">
@@ -30129,6 +30244,171 @@
                   </a:tcPr>
                 </a:tc>
                 <a:tc>
+                  <a:txBody>
+                    <a:bodyPr/>
+                    <a:lstStyle/>
+                    <a:p>
+                      <a:pPr latinLnBrk="1"/>
+                      <a:r>
+                        <a:rPr lang="en-US" altLang="ko-KR" dirty="0" smtClean="0"/>
+                        <a:t>Changed</a:t>
+                      </a:r>
+                      <a:r>
+                        <a:rPr lang="en-US" altLang="ko-KR" baseline="0" dirty="0" smtClean="0"/>
+                        <a:t> a button label </a:t>
+                      </a:r>
+                      <a:r>
+                        <a:rPr kumimoji="1" lang="en-US" altLang="ko-KR" baseline="0" dirty="0" smtClean="0"/>
+                        <a:t>‘Send password reset email’ to ‘Reset password’</a:t>
+                      </a:r>
+                      <a:endParaRPr lang="ko-KR" altLang="en-US" dirty="0"/>
+                    </a:p>
+                  </a:txBody>
+                  <a:tcPr anchor="ctr">
+                    <a:lnL w="12700" cap="flat" cmpd="sng" algn="ctr">
+                      <a:solidFill>
+                        <a:schemeClr val="tx1"/>
+                      </a:solidFill>
+                      <a:prstDash val="solid"/>
+                      <a:round/>
+                      <a:headEnd type="none" w="med" len="med"/>
+                      <a:tailEnd type="none" w="med" len="med"/>
+                    </a:lnL>
+                    <a:lnR w="12700" cap="flat" cmpd="sng" algn="ctr">
+                      <a:solidFill>
+                        <a:schemeClr val="tx1"/>
+                      </a:solidFill>
+                      <a:prstDash val="solid"/>
+                      <a:round/>
+                      <a:headEnd type="none" w="med" len="med"/>
+                      <a:tailEnd type="none" w="med" len="med"/>
+                    </a:lnR>
+                    <a:lnT w="12700" cap="flat" cmpd="sng" algn="ctr">
+                      <a:solidFill>
+                        <a:schemeClr val="tx1"/>
+                      </a:solidFill>
+                      <a:prstDash val="solid"/>
+                      <a:round/>
+                      <a:headEnd type="none" w="med" len="med"/>
+                      <a:tailEnd type="none" w="med" len="med"/>
+                    </a:lnT>
+                    <a:lnB w="12700" cap="flat" cmpd="sng" algn="ctr">
+                      <a:solidFill>
+                        <a:schemeClr val="tx1"/>
+                      </a:solidFill>
+                      <a:prstDash val="solid"/>
+                      <a:round/>
+                      <a:headEnd type="none" w="med" len="med"/>
+                      <a:tailEnd type="none" w="med" len="med"/>
+                    </a:lnB>
+                    <a:noFill/>
+                  </a:tcPr>
+                </a:tc>
+                <a:tc rowSpan="2">
+                  <a:txBody>
+                    <a:bodyPr/>
+                    <a:lstStyle/>
+                    <a:p>
+                      <a:pPr algn="ctr" latinLnBrk="1"/>
+                      <a:r>
+                        <a:rPr lang="en-US" altLang="ko-KR" smtClean="0"/>
+                        <a:t>0.5</a:t>
+                      </a:r>
+                      <a:endParaRPr lang="ko-KR" altLang="en-US" dirty="0"/>
+                    </a:p>
+                  </a:txBody>
+                  <a:tcPr anchor="ctr">
+                    <a:lnL w="12700" cap="flat" cmpd="sng" algn="ctr">
+                      <a:solidFill>
+                        <a:schemeClr val="tx1"/>
+                      </a:solidFill>
+                      <a:prstDash val="solid"/>
+                      <a:round/>
+                      <a:headEnd type="none" w="med" len="med"/>
+                      <a:tailEnd type="none" w="med" len="med"/>
+                    </a:lnL>
+                    <a:lnR w="12700" cap="flat" cmpd="sng" algn="ctr">
+                      <a:solidFill>
+                        <a:schemeClr val="tx1"/>
+                      </a:solidFill>
+                      <a:prstDash val="solid"/>
+                      <a:round/>
+                      <a:headEnd type="none" w="med" len="med"/>
+                      <a:tailEnd type="none" w="med" len="med"/>
+                    </a:lnR>
+                    <a:lnT w="12700" cap="flat" cmpd="sng" algn="ctr">
+                      <a:solidFill>
+                        <a:schemeClr val="tx1"/>
+                      </a:solidFill>
+                      <a:prstDash val="solid"/>
+                      <a:round/>
+                      <a:headEnd type="none" w="med" len="med"/>
+                      <a:tailEnd type="none" w="med" len="med"/>
+                    </a:lnT>
+                    <a:lnB w="12700" cap="flat" cmpd="sng" algn="ctr">
+                      <a:solidFill>
+                        <a:schemeClr val="tx1"/>
+                      </a:solidFill>
+                      <a:prstDash val="solid"/>
+                      <a:round/>
+                      <a:headEnd type="none" w="med" len="med"/>
+                      <a:tailEnd type="none" w="med" len="med"/>
+                    </a:lnB>
+                    <a:noFill/>
+                  </a:tcPr>
+                </a:tc>
+              </a:tr>
+              <a:tr h="403617">
+                <a:tc vMerge="1">
+                  <a:txBody>
+                    <a:bodyPr/>
+                    <a:lstStyle/>
+                    <a:p>
+                      <a:pPr latinLnBrk="1"/>
+                      <a:endParaRPr lang="ko-KR" altLang="en-US" dirty="0"/>
+                    </a:p>
+                  </a:txBody>
+                  <a:tcPr anchor="ctr">
+                    <a:lnL w="12700" cap="flat" cmpd="sng" algn="ctr">
+                      <a:solidFill>
+                        <a:schemeClr val="tx1"/>
+                      </a:solidFill>
+                      <a:prstDash val="solid"/>
+                      <a:round/>
+                      <a:headEnd type="none" w="med" len="med"/>
+                      <a:tailEnd type="none" w="med" len="med"/>
+                    </a:lnL>
+                    <a:lnR w="12700" cap="flat" cmpd="sng" algn="ctr">
+                      <a:solidFill>
+                        <a:schemeClr val="tx1"/>
+                      </a:solidFill>
+                      <a:prstDash val="solid"/>
+                      <a:round/>
+                      <a:headEnd type="none" w="med" len="med"/>
+                      <a:tailEnd type="none" w="med" len="med"/>
+                    </a:lnR>
+                    <a:lnT w="12700" cap="flat" cmpd="sng" algn="ctr">
+                      <a:solidFill>
+                        <a:schemeClr val="tx1"/>
+                      </a:solidFill>
+                      <a:prstDash val="solid"/>
+                      <a:round/>
+                      <a:headEnd type="none" w="med" len="med"/>
+                      <a:tailEnd type="none" w="med" len="med"/>
+                    </a:lnT>
+                    <a:lnB w="12700" cap="flat" cmpd="sng" algn="ctr">
+                      <a:solidFill>
+                        <a:schemeClr val="tx1"/>
+                      </a:solidFill>
+                      <a:prstDash val="solid"/>
+                      <a:round/>
+                      <a:headEnd type="none" w="med" len="med"/>
+                      <a:tailEnd type="none" w="med" len="med"/>
+                    </a:lnB>
+                    <a:noFill/>
+                  </a:tcPr>
+                </a:tc>
+                <a:tc vMerge="1">
                   <a:txBody>
                     <a:bodyPr/>
                     <a:lstStyle/>
@@ -30183,6 +30463,14 @@
                     <a:lstStyle/>
                     <a:p>
                       <a:pPr latinLnBrk="1"/>
+                      <a:r>
+                        <a:rPr lang="en-US" altLang="ko-KR" dirty="0" smtClean="0"/>
+                        <a:t>Updated contents</a:t>
+                      </a:r>
+                      <a:r>
+                        <a:rPr lang="en-US" altLang="ko-KR" baseline="0" dirty="0" smtClean="0"/>
+                        <a:t> table</a:t>
+                      </a:r>
                       <a:endParaRPr lang="ko-KR" altLang="en-US" dirty="0"/>
                     </a:p>
                   </a:txBody>
@@ -30226,205 +30514,7 @@
                     <a:noFill/>
                   </a:tcPr>
                 </a:tc>
-                <a:tc>
-                  <a:txBody>
-                    <a:bodyPr/>
-                    <a:lstStyle/>
-                    <a:p>
-                      <a:pPr algn="ctr" latinLnBrk="1"/>
-                      <a:endParaRPr lang="ko-KR" altLang="en-US" dirty="0"/>
-                    </a:p>
-                  </a:txBody>
-                  <a:tcPr anchor="ctr">
-                    <a:lnL w="12700" cap="flat" cmpd="sng" algn="ctr">
-                      <a:solidFill>
-                        <a:schemeClr val="tx1"/>
-                      </a:solidFill>
-                      <a:prstDash val="solid"/>
-                      <a:round/>
-                      <a:headEnd type="none" w="med" len="med"/>
-                      <a:tailEnd type="none" w="med" len="med"/>
-                    </a:lnL>
-                    <a:lnR w="12700" cap="flat" cmpd="sng" algn="ctr">
-                      <a:solidFill>
-                        <a:schemeClr val="tx1"/>
-                      </a:solidFill>
-                      <a:prstDash val="solid"/>
-                      <a:round/>
-                      <a:headEnd type="none" w="med" len="med"/>
-                      <a:tailEnd type="none" w="med" len="med"/>
-                    </a:lnR>
-                    <a:lnT w="12700" cap="flat" cmpd="sng" algn="ctr">
-                      <a:solidFill>
-                        <a:schemeClr val="tx1"/>
-                      </a:solidFill>
-                      <a:prstDash val="solid"/>
-                      <a:round/>
-                      <a:headEnd type="none" w="med" len="med"/>
-                      <a:tailEnd type="none" w="med" len="med"/>
-                    </a:lnT>
-                    <a:lnB w="12700" cap="flat" cmpd="sng" algn="ctr">
-                      <a:solidFill>
-                        <a:schemeClr val="tx1"/>
-                      </a:solidFill>
-                      <a:prstDash val="solid"/>
-                      <a:round/>
-                      <a:headEnd type="none" w="med" len="med"/>
-                      <a:tailEnd type="none" w="med" len="med"/>
-                    </a:lnB>
-                    <a:noFill/>
-                  </a:tcPr>
-                </a:tc>
-              </a:tr>
-              <a:tr h="403617">
-                <a:tc>
-                  <a:txBody>
-                    <a:bodyPr/>
-                    <a:lstStyle/>
-                    <a:p>
-                      <a:pPr latinLnBrk="1"/>
-                      <a:endParaRPr lang="ko-KR" altLang="en-US" dirty="0"/>
-                    </a:p>
-                  </a:txBody>
-                  <a:tcPr anchor="ctr">
-                    <a:lnL w="12700" cap="flat" cmpd="sng" algn="ctr">
-                      <a:solidFill>
-                        <a:schemeClr val="tx1"/>
-                      </a:solidFill>
-                      <a:prstDash val="solid"/>
-                      <a:round/>
-                      <a:headEnd type="none" w="med" len="med"/>
-                      <a:tailEnd type="none" w="med" len="med"/>
-                    </a:lnL>
-                    <a:lnR w="12700" cap="flat" cmpd="sng" algn="ctr">
-                      <a:solidFill>
-                        <a:schemeClr val="tx1"/>
-                      </a:solidFill>
-                      <a:prstDash val="solid"/>
-                      <a:round/>
-                      <a:headEnd type="none" w="med" len="med"/>
-                      <a:tailEnd type="none" w="med" len="med"/>
-                    </a:lnR>
-                    <a:lnT w="12700" cap="flat" cmpd="sng" algn="ctr">
-                      <a:solidFill>
-                        <a:schemeClr val="tx1"/>
-                      </a:solidFill>
-                      <a:prstDash val="solid"/>
-                      <a:round/>
-                      <a:headEnd type="none" w="med" len="med"/>
-                      <a:tailEnd type="none" w="med" len="med"/>
-                    </a:lnT>
-                    <a:lnB w="12700" cap="flat" cmpd="sng" algn="ctr">
-                      <a:solidFill>
-                        <a:schemeClr val="tx1"/>
-                      </a:solidFill>
-                      <a:prstDash val="solid"/>
-                      <a:round/>
-                      <a:headEnd type="none" w="med" len="med"/>
-                      <a:tailEnd type="none" w="med" len="med"/>
-                    </a:lnB>
-                    <a:noFill/>
-                  </a:tcPr>
-                </a:tc>
-                <a:tc>
-                  <a:txBody>
-                    <a:bodyPr/>
-                    <a:lstStyle/>
-                    <a:p>
-                      <a:pPr algn="ctr" latinLnBrk="1"/>
-                      <a:endParaRPr lang="ko-KR" altLang="en-US" dirty="0"/>
-                    </a:p>
-                  </a:txBody>
-                  <a:tcPr anchor="ctr">
-                    <a:lnL w="12700" cap="flat" cmpd="sng" algn="ctr">
-                      <a:solidFill>
-                        <a:schemeClr val="tx1"/>
-                      </a:solidFill>
-                      <a:prstDash val="solid"/>
-                      <a:round/>
-                      <a:headEnd type="none" w="med" len="med"/>
-                      <a:tailEnd type="none" w="med" len="med"/>
-                    </a:lnL>
-                    <a:lnR w="12700" cap="flat" cmpd="sng" algn="ctr">
-                      <a:solidFill>
-                        <a:schemeClr val="tx1"/>
-                      </a:solidFill>
-                      <a:prstDash val="solid"/>
-                      <a:round/>
-                      <a:headEnd type="none" w="med" len="med"/>
-                      <a:tailEnd type="none" w="med" len="med"/>
-                    </a:lnR>
-                    <a:lnT w="12700" cap="flat" cmpd="sng" algn="ctr">
-                      <a:solidFill>
-                        <a:schemeClr val="tx1"/>
-                      </a:solidFill>
-                      <a:prstDash val="solid"/>
-                      <a:round/>
-                      <a:headEnd type="none" w="med" len="med"/>
-                      <a:tailEnd type="none" w="med" len="med"/>
-                    </a:lnT>
-                    <a:lnB w="12700" cap="flat" cmpd="sng" algn="ctr">
-                      <a:solidFill>
-                        <a:schemeClr val="tx1"/>
-                      </a:solidFill>
-                      <a:prstDash val="solid"/>
-                      <a:round/>
-                      <a:headEnd type="none" w="med" len="med"/>
-                      <a:tailEnd type="none" w="med" len="med"/>
-                    </a:lnB>
-                    <a:noFill/>
-                  </a:tcPr>
-                </a:tc>
-                <a:tc>
-                  <a:txBody>
-                    <a:bodyPr/>
-                    <a:lstStyle/>
-                    <a:p>
-                      <a:pPr latinLnBrk="1"/>
-                      <a:endParaRPr lang="ko-KR" altLang="en-US" dirty="0"/>
-                    </a:p>
-                  </a:txBody>
-                  <a:tcPr anchor="ctr">
-                    <a:lnL w="12700" cap="flat" cmpd="sng" algn="ctr">
-                      <a:solidFill>
-                        <a:schemeClr val="tx1"/>
-                      </a:solidFill>
-                      <a:prstDash val="solid"/>
-                      <a:round/>
-                      <a:headEnd type="none" w="med" len="med"/>
-                      <a:tailEnd type="none" w="med" len="med"/>
-                    </a:lnL>
-                    <a:lnR w="12700" cap="flat" cmpd="sng" algn="ctr">
-                      <a:solidFill>
-                        <a:schemeClr val="tx1"/>
-                      </a:solidFill>
-                      <a:prstDash val="solid"/>
-                      <a:round/>
-                      <a:headEnd type="none" w="med" len="med"/>
-                      <a:tailEnd type="none" w="med" len="med"/>
-                    </a:lnR>
-                    <a:lnT w="12700" cap="flat" cmpd="sng" algn="ctr">
-                      <a:solidFill>
-                        <a:schemeClr val="tx1"/>
-                      </a:solidFill>
-                      <a:prstDash val="solid"/>
-                      <a:round/>
-                      <a:headEnd type="none" w="med" len="med"/>
-                      <a:tailEnd type="none" w="med" len="med"/>
-                    </a:lnT>
-                    <a:lnB w="12700" cap="flat" cmpd="sng" algn="ctr">
-                      <a:solidFill>
-                        <a:schemeClr val="tx1"/>
-                      </a:solidFill>
-                      <a:prstDash val="solid"/>
-                      <a:round/>
-                      <a:headEnd type="none" w="med" len="med"/>
-                      <a:tailEnd type="none" w="med" len="med"/>
-                    </a:lnB>
-                    <a:noFill/>
-                  </a:tcPr>
-                </a:tc>
-                <a:tc>
+                <a:tc vMerge="1">
                   <a:txBody>
                     <a:bodyPr/>
                     <a:lstStyle/>
@@ -32462,20 +32552,12 @@
           <a:p>
             <a:pPr algn="ctr"/>
             <a:r>
-              <a:rPr kumimoji="1" lang="en-US" altLang="ko-KR" sz="1400" smtClean="0">
-                <a:solidFill>
-                  <a:schemeClr val="tx1"/>
-                </a:solidFill>
-              </a:rPr>
-              <a:t>Send password </a:t>
-            </a:r>
-            <a:r>
               <a:rPr kumimoji="1" lang="en-US" altLang="ko-KR" sz="1400" dirty="0" smtClean="0">
                 <a:solidFill>
                   <a:schemeClr val="tx1"/>
                 </a:solidFill>
               </a:rPr>
-              <a:t>reset email</a:t>
+              <a:t>Reset password</a:t>
             </a:r>
             <a:endParaRPr kumimoji="1" lang="ko-KR" altLang="en-US" sz="1400" dirty="0">
               <a:solidFill>

</xml_diff>

<commit_message>
Change a button label on the For Got Password page
'Reset password' -> 'Request for account verification'
</commit_message>
<xml_diff>
--- a/docs/GUI_Design_Concepts.pptx
+++ b/docs/GUI_Design_Concepts.pptx
@@ -310,7 +310,7 @@
           <a:p>
             <a:fld id="{E11AA8F0-6258-3347-BD1B-F58EE29071D0}" type="datetimeFigureOut">
               <a:rPr kumimoji="1" lang="ko-KR" altLang="en-US" smtClean="0"/>
-              <a:t>2016. 12. 8.</a:t>
+              <a:t>2016. 12. 21.</a:t>
             </a:fld>
             <a:endParaRPr kumimoji="1" lang="ko-KR" altLang="en-US"/>
           </a:p>
@@ -2371,11 +2371,15 @@
             </a:r>
             <a:r>
               <a:rPr kumimoji="1" lang="en-US" altLang="ko-KR" baseline="0" dirty="0" smtClean="0"/>
-              <a:t>‘Send password reset email’</a:t>
+              <a:t>‘Request for account verification’</a:t>
             </a:r>
             <a:r>
               <a:rPr kumimoji="1" lang="ko-KR" altLang="en-US" baseline="0" dirty="0" smtClean="0"/>
-              <a:t> 버튼 클릭</a:t>
+              <a:t> </a:t>
+            </a:r>
+            <a:r>
+              <a:rPr kumimoji="1" lang="ko-KR" altLang="en-US" baseline="0" dirty="0" smtClean="0"/>
+              <a:t>버튼 클릭</a:t>
             </a:r>
             <a:r>
               <a:rPr kumimoji="1" lang="en-US" altLang="ko-KR" baseline="0" dirty="0" smtClean="0"/>
@@ -4783,7 +4787,7 @@
           <a:p>
             <a:fld id="{90048598-6D35-43ED-A7A9-749CF1B40A27}" type="datetimeFigureOut">
               <a:rPr lang="ko-KR" altLang="en-US" smtClean="0"/>
-              <a:t>2016. 12. 8.</a:t>
+              <a:t>2016. 12. 21.</a:t>
             </a:fld>
             <a:endParaRPr lang="ko-KR" altLang="en-US"/>
           </a:p>
@@ -4993,7 +4997,7 @@
           <a:p>
             <a:fld id="{90048598-6D35-43ED-A7A9-749CF1B40A27}" type="datetimeFigureOut">
               <a:rPr lang="ko-KR" altLang="en-US" smtClean="0"/>
-              <a:t>2016. 12. 8.</a:t>
+              <a:t>2016. 12. 21.</a:t>
             </a:fld>
             <a:endParaRPr lang="ko-KR" altLang="en-US"/>
           </a:p>
@@ -5203,7 +5207,7 @@
           <a:p>
             <a:fld id="{90048598-6D35-43ED-A7A9-749CF1B40A27}" type="datetimeFigureOut">
               <a:rPr lang="ko-KR" altLang="en-US" smtClean="0"/>
-              <a:t>2016. 12. 8.</a:t>
+              <a:t>2016. 12. 21.</a:t>
             </a:fld>
             <a:endParaRPr lang="ko-KR" altLang="en-US"/>
           </a:p>
@@ -6024,7 +6028,7 @@
           <a:p>
             <a:fld id="{90048598-6D35-43ED-A7A9-749CF1B40A27}" type="datetimeFigureOut">
               <a:rPr lang="ko-KR" altLang="en-US" smtClean="0"/>
-              <a:t>2016. 12. 8.</a:t>
+              <a:t>2016. 12. 21.</a:t>
             </a:fld>
             <a:endParaRPr lang="ko-KR" altLang="en-US"/>
           </a:p>
@@ -6430,7 +6434,7 @@
           <a:p>
             <a:fld id="{90048598-6D35-43ED-A7A9-749CF1B40A27}" type="datetimeFigureOut">
               <a:rPr lang="ko-KR" altLang="en-US" smtClean="0"/>
-              <a:t>2016. 12. 8.</a:t>
+              <a:t>2016. 12. 21.</a:t>
             </a:fld>
             <a:endParaRPr lang="ko-KR" altLang="en-US"/>
           </a:p>
@@ -6580,7 +6584,7 @@
           <a:p>
             <a:fld id="{90048598-6D35-43ED-A7A9-749CF1B40A27}" type="datetimeFigureOut">
               <a:rPr lang="ko-KR" altLang="en-US" smtClean="0"/>
-              <a:t>2016. 12. 8.</a:t>
+              <a:t>2016. 12. 21.</a:t>
             </a:fld>
             <a:endParaRPr lang="ko-KR" altLang="en-US"/>
           </a:p>
@@ -6699,7 +6703,7 @@
           <a:p>
             <a:fld id="{90048598-6D35-43ED-A7A9-749CF1B40A27}" type="datetimeFigureOut">
               <a:rPr lang="ko-KR" altLang="en-US" smtClean="0"/>
-              <a:t>2016. 12. 8.</a:t>
+              <a:t>2016. 12. 21.</a:t>
             </a:fld>
             <a:endParaRPr lang="ko-KR" altLang="en-US"/>
           </a:p>
@@ -7009,7 +7013,7 @@
           <a:p>
             <a:fld id="{90048598-6D35-43ED-A7A9-749CF1B40A27}" type="datetimeFigureOut">
               <a:rPr lang="ko-KR" altLang="en-US" smtClean="0"/>
-              <a:t>2016. 12. 8.</a:t>
+              <a:t>2016. 12. 21.</a:t>
             </a:fld>
             <a:endParaRPr lang="ko-KR" altLang="en-US"/>
           </a:p>
@@ -25827,18 +25831,7 @@
                   </a:schemeClr>
                 </a:solidFill>
               </a:rPr>
-              <a:t>Sign </a:t>
-            </a:r>
-            <a:r>
-              <a:rPr lang="en-US" altLang="ko-KR" sz="1800" dirty="0" smtClean="0">
-                <a:solidFill>
-                  <a:schemeClr val="tx1">
-                    <a:lumMod val="75000"/>
-                    <a:lumOff val="25000"/>
-                  </a:schemeClr>
-                </a:solidFill>
-              </a:rPr>
-              <a:t>In</a:t>
+              <a:t>Sign In</a:t>
             </a:r>
           </a:p>
           <a:p>
@@ -25875,14 +25868,6 @@
               </a:rPr>
               <a:t>assword</a:t>
             </a:r>
-            <a:endParaRPr lang="en-US" altLang="ko-KR" sz="1800" dirty="0" smtClean="0">
-              <a:solidFill>
-                <a:schemeClr val="tx1">
-                  <a:lumMod val="75000"/>
-                  <a:lumOff val="25000"/>
-                </a:schemeClr>
-              </a:solidFill>
-            </a:endParaRPr>
           </a:p>
           <a:p>
             <a:r>
@@ -28798,14 +28783,14 @@
           <p:nvPr>
             <p:extLst>
               <p:ext uri="{D42A27DB-BD31-4B8C-83A1-F6EECF244321}">
-                <p14:modId xmlns:p14="http://schemas.microsoft.com/office/powerpoint/2010/main" val="1210055927"/>
+                <p14:modId xmlns:p14="http://schemas.microsoft.com/office/powerpoint/2010/main" val="368616045"/>
               </p:ext>
             </p:extLst>
           </p:nvPr>
         </p:nvGraphicFramePr>
         <p:xfrm>
           <a:off x="1559860" y="1176186"/>
-          <a:ext cx="10367683" cy="5682090"/>
+          <a:ext cx="10367683" cy="5514936"/>
         </p:xfrm>
         <a:graphic>
           <a:graphicData uri="http://schemas.openxmlformats.org/drawingml/2006/table">
@@ -30571,6 +30556,14 @@
                     <a:lstStyle/>
                     <a:p>
                       <a:pPr latinLnBrk="1"/>
+                      <a:r>
+                        <a:rPr lang="en-US" altLang="ko-KR" dirty="0" err="1" smtClean="0"/>
+                        <a:t>Jeonghwan</a:t>
+                      </a:r>
+                      <a:r>
+                        <a:rPr lang="en-US" altLang="ko-KR" baseline="0" dirty="0" smtClean="0"/>
+                        <a:t> Bae</a:t>
+                      </a:r>
                       <a:endParaRPr lang="ko-KR" altLang="en-US" dirty="0"/>
                     </a:p>
                   </a:txBody>
@@ -30620,6 +30613,10 @@
                     <a:lstStyle/>
                     <a:p>
                       <a:pPr algn="ctr" latinLnBrk="1"/>
+                      <a:r>
+                        <a:rPr lang="en-US" altLang="ko-KR" dirty="0" smtClean="0"/>
+                        <a:t>2016-12-21</a:t>
+                      </a:r>
                       <a:endParaRPr lang="ko-KR" altLang="en-US" dirty="0"/>
                     </a:p>
                   </a:txBody>
@@ -30669,6 +30666,18 @@
                     <a:lstStyle/>
                     <a:p>
                       <a:pPr latinLnBrk="1"/>
+                      <a:r>
+                        <a:rPr lang="en-US" altLang="ko-KR" smtClean="0"/>
+                        <a:t>Replaced</a:t>
+                      </a:r>
+                      <a:r>
+                        <a:rPr lang="en-US" altLang="ko-KR" baseline="0" smtClean="0"/>
+                        <a:t> ‘Request </a:t>
+                      </a:r>
+                      <a:r>
+                        <a:rPr lang="en-US" altLang="ko-KR" baseline="0" dirty="0" smtClean="0"/>
+                        <a:t>for account verification’ from ‘Reset password’</a:t>
+                      </a:r>
                       <a:endParaRPr lang="ko-KR" altLang="en-US" dirty="0"/>
                     </a:p>
                   </a:txBody>
@@ -30718,6 +30727,10 @@
                     <a:lstStyle/>
                     <a:p>
                       <a:pPr algn="ctr" latinLnBrk="1"/>
+                      <a:r>
+                        <a:rPr lang="en-US" altLang="ko-KR" dirty="0" smtClean="0"/>
+                        <a:t>0.6</a:t>
+                      </a:r>
                       <a:endParaRPr lang="ko-KR" altLang="en-US" dirty="0"/>
                     </a:p>
                   </a:txBody>
@@ -30968,204 +30981,6 @@
                     <a:p>
                       <a:pPr latinLnBrk="1"/>
                       <a:endParaRPr lang="ko-KR" altLang="en-US" dirty="0"/>
-                    </a:p>
-                  </a:txBody>
-                  <a:tcPr anchor="ctr">
-                    <a:lnL w="12700" cap="flat" cmpd="sng" algn="ctr">
-                      <a:solidFill>
-                        <a:schemeClr val="tx1"/>
-                      </a:solidFill>
-                      <a:prstDash val="solid"/>
-                      <a:round/>
-                      <a:headEnd type="none" w="med" len="med"/>
-                      <a:tailEnd type="none" w="med" len="med"/>
-                    </a:lnL>
-                    <a:lnR w="12700" cap="flat" cmpd="sng" algn="ctr">
-                      <a:solidFill>
-                        <a:schemeClr val="tx1"/>
-                      </a:solidFill>
-                      <a:prstDash val="solid"/>
-                      <a:round/>
-                      <a:headEnd type="none" w="med" len="med"/>
-                      <a:tailEnd type="none" w="med" len="med"/>
-                    </a:lnR>
-                    <a:lnT w="12700" cap="flat" cmpd="sng" algn="ctr">
-                      <a:solidFill>
-                        <a:schemeClr val="tx1"/>
-                      </a:solidFill>
-                      <a:prstDash val="solid"/>
-                      <a:round/>
-                      <a:headEnd type="none" w="med" len="med"/>
-                      <a:tailEnd type="none" w="med" len="med"/>
-                    </a:lnT>
-                    <a:lnB w="12700" cap="flat" cmpd="sng" algn="ctr">
-                      <a:solidFill>
-                        <a:schemeClr val="tx1"/>
-                      </a:solidFill>
-                      <a:prstDash val="solid"/>
-                      <a:round/>
-                      <a:headEnd type="none" w="med" len="med"/>
-                      <a:tailEnd type="none" w="med" len="med"/>
-                    </a:lnB>
-                    <a:noFill/>
-                  </a:tcPr>
-                </a:tc>
-                <a:tc>
-                  <a:txBody>
-                    <a:bodyPr/>
-                    <a:lstStyle/>
-                    <a:p>
-                      <a:pPr algn="ctr" latinLnBrk="1"/>
-                      <a:endParaRPr lang="ko-KR" altLang="en-US" dirty="0"/>
-                    </a:p>
-                  </a:txBody>
-                  <a:tcPr anchor="ctr">
-                    <a:lnL w="12700" cap="flat" cmpd="sng" algn="ctr">
-                      <a:solidFill>
-                        <a:schemeClr val="tx1"/>
-                      </a:solidFill>
-                      <a:prstDash val="solid"/>
-                      <a:round/>
-                      <a:headEnd type="none" w="med" len="med"/>
-                      <a:tailEnd type="none" w="med" len="med"/>
-                    </a:lnL>
-                    <a:lnR w="12700" cap="flat" cmpd="sng" algn="ctr">
-                      <a:solidFill>
-                        <a:schemeClr val="tx1"/>
-                      </a:solidFill>
-                      <a:prstDash val="solid"/>
-                      <a:round/>
-                      <a:headEnd type="none" w="med" len="med"/>
-                      <a:tailEnd type="none" w="med" len="med"/>
-                    </a:lnR>
-                    <a:lnT w="12700" cap="flat" cmpd="sng" algn="ctr">
-                      <a:solidFill>
-                        <a:schemeClr val="tx1"/>
-                      </a:solidFill>
-                      <a:prstDash val="solid"/>
-                      <a:round/>
-                      <a:headEnd type="none" w="med" len="med"/>
-                      <a:tailEnd type="none" w="med" len="med"/>
-                    </a:lnT>
-                    <a:lnB w="12700" cap="flat" cmpd="sng" algn="ctr">
-                      <a:solidFill>
-                        <a:schemeClr val="tx1"/>
-                      </a:solidFill>
-                      <a:prstDash val="solid"/>
-                      <a:round/>
-                      <a:headEnd type="none" w="med" len="med"/>
-                      <a:tailEnd type="none" w="med" len="med"/>
-                    </a:lnB>
-                    <a:noFill/>
-                  </a:tcPr>
-                </a:tc>
-                <a:tc>
-                  <a:txBody>
-                    <a:bodyPr/>
-                    <a:lstStyle/>
-                    <a:p>
-                      <a:pPr latinLnBrk="1"/>
-                      <a:endParaRPr lang="ko-KR" altLang="en-US" dirty="0"/>
-                    </a:p>
-                  </a:txBody>
-                  <a:tcPr anchor="ctr">
-                    <a:lnL w="12700" cap="flat" cmpd="sng" algn="ctr">
-                      <a:solidFill>
-                        <a:schemeClr val="tx1"/>
-                      </a:solidFill>
-                      <a:prstDash val="solid"/>
-                      <a:round/>
-                      <a:headEnd type="none" w="med" len="med"/>
-                      <a:tailEnd type="none" w="med" len="med"/>
-                    </a:lnL>
-                    <a:lnR w="12700" cap="flat" cmpd="sng" algn="ctr">
-                      <a:solidFill>
-                        <a:schemeClr val="tx1"/>
-                      </a:solidFill>
-                      <a:prstDash val="solid"/>
-                      <a:round/>
-                      <a:headEnd type="none" w="med" len="med"/>
-                      <a:tailEnd type="none" w="med" len="med"/>
-                    </a:lnR>
-                    <a:lnT w="12700" cap="flat" cmpd="sng" algn="ctr">
-                      <a:solidFill>
-                        <a:schemeClr val="tx1"/>
-                      </a:solidFill>
-                      <a:prstDash val="solid"/>
-                      <a:round/>
-                      <a:headEnd type="none" w="med" len="med"/>
-                      <a:tailEnd type="none" w="med" len="med"/>
-                    </a:lnT>
-                    <a:lnB w="12700" cap="flat" cmpd="sng" algn="ctr">
-                      <a:solidFill>
-                        <a:schemeClr val="tx1"/>
-                      </a:solidFill>
-                      <a:prstDash val="solid"/>
-                      <a:round/>
-                      <a:headEnd type="none" w="med" len="med"/>
-                      <a:tailEnd type="none" w="med" len="med"/>
-                    </a:lnB>
-                    <a:noFill/>
-                  </a:tcPr>
-                </a:tc>
-                <a:tc>
-                  <a:txBody>
-                    <a:bodyPr/>
-                    <a:lstStyle/>
-                    <a:p>
-                      <a:pPr algn="ctr" latinLnBrk="1"/>
-                      <a:endParaRPr lang="ko-KR" altLang="en-US" dirty="0"/>
-                    </a:p>
-                  </a:txBody>
-                  <a:tcPr anchor="ctr">
-                    <a:lnL w="12700" cap="flat" cmpd="sng" algn="ctr">
-                      <a:solidFill>
-                        <a:schemeClr val="tx1"/>
-                      </a:solidFill>
-                      <a:prstDash val="solid"/>
-                      <a:round/>
-                      <a:headEnd type="none" w="med" len="med"/>
-                      <a:tailEnd type="none" w="med" len="med"/>
-                    </a:lnL>
-                    <a:lnR w="12700" cap="flat" cmpd="sng" algn="ctr">
-                      <a:solidFill>
-                        <a:schemeClr val="tx1"/>
-                      </a:solidFill>
-                      <a:prstDash val="solid"/>
-                      <a:round/>
-                      <a:headEnd type="none" w="med" len="med"/>
-                      <a:tailEnd type="none" w="med" len="med"/>
-                    </a:lnR>
-                    <a:lnT w="12700" cap="flat" cmpd="sng" algn="ctr">
-                      <a:solidFill>
-                        <a:schemeClr val="tx1"/>
-                      </a:solidFill>
-                      <a:prstDash val="solid"/>
-                      <a:round/>
-                      <a:headEnd type="none" w="med" len="med"/>
-                      <a:tailEnd type="none" w="med" len="med"/>
-                    </a:lnT>
-                    <a:lnB w="12700" cap="flat" cmpd="sng" algn="ctr">
-                      <a:solidFill>
-                        <a:schemeClr val="tx1"/>
-                      </a:solidFill>
-                      <a:prstDash val="solid"/>
-                      <a:round/>
-                      <a:headEnd type="none" w="med" len="med"/>
-                      <a:tailEnd type="none" w="med" len="med"/>
-                    </a:lnB>
-                    <a:noFill/>
-                  </a:tcPr>
-                </a:tc>
-              </a:tr>
-              <a:tr h="403617">
-                <a:tc>
-                  <a:txBody>
-                    <a:bodyPr/>
-                    <a:lstStyle/>
-                    <a:p>
-                      <a:pPr latinLnBrk="1"/>
-                      <a:endParaRPr lang="ko-KR" altLang="en-US"/>
                     </a:p>
                   </a:txBody>
                   <a:tcPr anchor="ctr">
@@ -32557,7 +32372,7 @@
                   <a:schemeClr val="tx1"/>
                 </a:solidFill>
               </a:rPr>
-              <a:t>Reset password</a:t>
+              <a:t>Request for account verification</a:t>
             </a:r>
             <a:endParaRPr kumimoji="1" lang="ko-KR" altLang="en-US" sz="1400" dirty="0">
               <a:solidFill>

</xml_diff>